<commit_message>
Screenshots document updated with latest version of task from MAR
</commit_message>
<xml_diff>
--- a/Insulin Order screenshots.pptx
+++ b/Insulin Order screenshots.pptx
@@ -5,19 +5,21 @@
     <p:sldMasterId id="2147483648" r:id="rId1"/>
   </p:sldMasterIdLst>
   <p:notesMasterIdLst>
-    <p:notesMasterId r:id="rId9"/>
+    <p:notesMasterId r:id="rId11"/>
   </p:notesMasterIdLst>
   <p:handoutMasterIdLst>
-    <p:handoutMasterId r:id="rId10"/>
+    <p:handoutMasterId r:id="rId12"/>
   </p:handoutMasterIdLst>
   <p:sldIdLst>
     <p:sldId id="283" r:id="rId2"/>
     <p:sldId id="285" r:id="rId3"/>
     <p:sldId id="284" r:id="rId4"/>
-    <p:sldId id="310" r:id="rId5"/>
-    <p:sldId id="311" r:id="rId6"/>
-    <p:sldId id="309" r:id="rId7"/>
-    <p:sldId id="308" r:id="rId8"/>
+    <p:sldId id="313" r:id="rId5"/>
+    <p:sldId id="314" r:id="rId6"/>
+    <p:sldId id="310" r:id="rId7"/>
+    <p:sldId id="311" r:id="rId8"/>
+    <p:sldId id="309" r:id="rId9"/>
+    <p:sldId id="308" r:id="rId10"/>
   </p:sldIdLst>
   <p:sldSz cx="9144000" cy="6858000" type="screen4x3"/>
   <p:notesSz cx="7010400" cy="9296400"/>
@@ -249,6 +251,10 @@
 </p:presentation>
 </file>
 
+<file path=ppt/revisionInfo.xml><?xml version="1.0" encoding="utf-8"?>
+<p1510:revInfo xmlns:a="http://schemas.openxmlformats.org/drawingml/2006/main" xmlns:r="http://schemas.openxmlformats.org/officeDocument/2006/relationships" xmlns:p1510="http://schemas.microsoft.com/office/powerpoint/2015/10/main"/>
+</file>
+
 <file path=ppt/handoutMasters/handoutMaster1.xml><?xml version="1.0" encoding="utf-8"?>
 <p:handoutMaster xmlns:a="http://schemas.openxmlformats.org/drawingml/2006/main" xmlns:r="http://schemas.openxmlformats.org/officeDocument/2006/relationships" xmlns:p="http://schemas.openxmlformats.org/presentationml/2006/main">
   <p:cSld>
@@ -1596,7 +1602,7 @@
             <a:fld id="{95C617A2-BC7F-4CF8-A1B0-BE50125BCB9F}" type="datetimeFigureOut">
               <a:rPr lang="en-US" smtClean="0"/>
               <a:pPr/>
-              <a:t>9/25/2019</a:t>
+              <a:t>10/21/2019</a:t>
             </a:fld>
             <a:endParaRPr lang="en-US" dirty="0"/>
           </a:p>
@@ -2235,7 +2241,7 @@
             <a:fld id="{95C617A2-BC7F-4CF8-A1B0-BE50125BCB9F}" type="datetimeFigureOut">
               <a:rPr lang="en-US" smtClean="0"/>
               <a:pPr/>
-              <a:t>9/25/2019</a:t>
+              <a:t>10/21/2019</a:t>
             </a:fld>
             <a:endParaRPr lang="en-US" dirty="0"/>
           </a:p>
@@ -3460,7 +3466,7 @@
             <a:fld id="{95C617A2-BC7F-4CF8-A1B0-BE50125BCB9F}" type="datetimeFigureOut">
               <a:rPr lang="en-US" smtClean="0"/>
               <a:pPr/>
-              <a:t>9/25/2019</a:t>
+              <a:t>10/21/2019</a:t>
             </a:fld>
             <a:endParaRPr lang="en-US" dirty="0"/>
           </a:p>
@@ -4189,7 +4195,7 @@
             <a:fld id="{95C617A2-BC7F-4CF8-A1B0-BE50125BCB9F}" type="datetimeFigureOut">
               <a:rPr lang="en-US" smtClean="0"/>
               <a:pPr/>
-              <a:t>9/25/2019</a:t>
+              <a:t>10/21/2019</a:t>
             </a:fld>
             <a:endParaRPr lang="en-US" dirty="0"/>
           </a:p>
@@ -5926,7 +5932,7 @@
             <a:fld id="{95C617A2-BC7F-4CF8-A1B0-BE50125BCB9F}" type="datetimeFigureOut">
               <a:rPr lang="en-US" smtClean="0"/>
               <a:pPr/>
-              <a:t>9/25/2019</a:t>
+              <a:t>10/21/2019</a:t>
             </a:fld>
             <a:endParaRPr lang="en-US" dirty="0"/>
           </a:p>
@@ -8079,7 +8085,7 @@
         </p:blipFill>
         <p:spPr>
           <a:xfrm>
-            <a:off x="1859852" y="2431929"/>
+            <a:off x="1880207" y="2384985"/>
             <a:ext cx="3490304" cy="2301215"/>
           </a:xfrm>
           <a:prstGeom prst="rect">
@@ -8452,6 +8458,227 @@
 </file>
 
 <file path=ppt/slides/slide4.xml><?xml version="1.0" encoding="utf-8"?>
+<p:sld xmlns:a="http://schemas.openxmlformats.org/drawingml/2006/main" xmlns:r="http://schemas.openxmlformats.org/officeDocument/2006/relationships" xmlns:p="http://schemas.openxmlformats.org/presentationml/2006/main" showMasterSp="0">
+  <p:cSld>
+    <p:spTree>
+      <p:nvGrpSpPr>
+        <p:cNvPr id="1" name=""/>
+        <p:cNvGrpSpPr/>
+        <p:nvPr/>
+      </p:nvGrpSpPr>
+      <p:grpSpPr>
+        <a:xfrm>
+          <a:off x="0" y="0"/>
+          <a:ext cx="0" cy="0"/>
+          <a:chOff x="0" y="0"/>
+          <a:chExt cx="0" cy="0"/>
+        </a:xfrm>
+      </p:grpSpPr>
+      <p:pic>
+        <p:nvPicPr>
+          <p:cNvPr id="4" name="Content Placeholder 3">
+            <a:extLst>
+              <a:ext uri="{FF2B5EF4-FFF2-40B4-BE49-F238E27FC236}">
+                <a16:creationId xmlns:a16="http://schemas.microsoft.com/office/drawing/2014/main" id="{7AC35ED5-6741-47C2-933C-CBFC4BFDD568}"/>
+              </a:ext>
+            </a:extLst>
+          </p:cNvPr>
+          <p:cNvPicPr>
+            <a:picLocks noGrp="1" noChangeAspect="1"/>
+          </p:cNvPicPr>
+          <p:nvPr>
+            <p:ph idx="1"/>
+          </p:nvPr>
+        </p:nvPicPr>
+        <p:blipFill>
+          <a:blip r:embed="rId2"/>
+          <a:stretch>
+            <a:fillRect/>
+          </a:stretch>
+        </p:blipFill>
+        <p:spPr>
+          <a:xfrm>
+            <a:off x="173913" y="3088266"/>
+            <a:ext cx="4448074" cy="2931685"/>
+          </a:xfrm>
+          <a:prstGeom prst="rect">
+            <a:avLst/>
+          </a:prstGeom>
+        </p:spPr>
+      </p:pic>
+      <p:pic>
+        <p:nvPicPr>
+          <p:cNvPr id="5" name="Content Placeholder 3">
+            <a:extLst>
+              <a:ext uri="{FF2B5EF4-FFF2-40B4-BE49-F238E27FC236}">
+                <a16:creationId xmlns:a16="http://schemas.microsoft.com/office/drawing/2014/main" id="{B40A25BF-E610-4A08-811A-33A9563D7F18}"/>
+              </a:ext>
+            </a:extLst>
+          </p:cNvPr>
+          <p:cNvPicPr>
+            <a:picLocks noChangeAspect="1"/>
+          </p:cNvPicPr>
+          <p:nvPr/>
+        </p:nvPicPr>
+        <p:blipFill>
+          <a:blip r:embed="rId3"/>
+          <a:stretch>
+            <a:fillRect/>
+          </a:stretch>
+        </p:blipFill>
+        <p:spPr bwMode="auto">
+          <a:xfrm>
+            <a:off x="255800" y="408269"/>
+            <a:ext cx="5355075" cy="2419400"/>
+          </a:xfrm>
+          <a:prstGeom prst="rect">
+            <a:avLst/>
+          </a:prstGeom>
+          <a:noFill/>
+          <a:ln w="9525">
+            <a:noFill/>
+            <a:miter lim="800000"/>
+            <a:headEnd/>
+            <a:tailEnd/>
+          </a:ln>
+        </p:spPr>
+      </p:pic>
+      <p:pic>
+        <p:nvPicPr>
+          <p:cNvPr id="11" name="Picture 10">
+            <a:extLst>
+              <a:ext uri="{FF2B5EF4-FFF2-40B4-BE49-F238E27FC236}">
+                <a16:creationId xmlns:a16="http://schemas.microsoft.com/office/drawing/2014/main" id="{E0084F51-BDC4-4979-988E-A2B15EE73EB3}"/>
+              </a:ext>
+            </a:extLst>
+          </p:cNvPr>
+          <p:cNvPicPr>
+            <a:picLocks noChangeAspect="1"/>
+          </p:cNvPicPr>
+          <p:nvPr/>
+        </p:nvPicPr>
+        <p:blipFill>
+          <a:blip r:embed="rId4"/>
+          <a:stretch>
+            <a:fillRect/>
+          </a:stretch>
+        </p:blipFill>
+        <p:spPr>
+          <a:xfrm>
+            <a:off x="4903457" y="2827669"/>
+            <a:ext cx="3844760" cy="3926881"/>
+          </a:xfrm>
+          <a:prstGeom prst="rect">
+            <a:avLst/>
+          </a:prstGeom>
+        </p:spPr>
+      </p:pic>
+    </p:spTree>
+    <p:extLst>
+      <p:ext uri="{BB962C8B-B14F-4D97-AF65-F5344CB8AC3E}">
+        <p14:creationId xmlns:p14="http://schemas.microsoft.com/office/powerpoint/2010/main" val="777744875"/>
+      </p:ext>
+    </p:extLst>
+  </p:cSld>
+  <p:clrMapOvr>
+    <a:masterClrMapping/>
+  </p:clrMapOvr>
+</p:sld>
+</file>
+
+<file path=ppt/slides/slide5.xml><?xml version="1.0" encoding="utf-8"?>
+<p:sld xmlns:a="http://schemas.openxmlformats.org/drawingml/2006/main" xmlns:r="http://schemas.openxmlformats.org/officeDocument/2006/relationships" xmlns:p="http://schemas.openxmlformats.org/presentationml/2006/main" showMasterSp="0">
+  <p:cSld>
+    <p:spTree>
+      <p:nvGrpSpPr>
+        <p:cNvPr id="1" name=""/>
+        <p:cNvGrpSpPr/>
+        <p:nvPr/>
+      </p:nvGrpSpPr>
+      <p:grpSpPr>
+        <a:xfrm>
+          <a:off x="0" y="0"/>
+          <a:ext cx="0" cy="0"/>
+          <a:chOff x="0" y="0"/>
+          <a:chExt cx="0" cy="0"/>
+        </a:xfrm>
+      </p:grpSpPr>
+      <p:pic>
+        <p:nvPicPr>
+          <p:cNvPr id="4" name="Content Placeholder 3">
+            <a:extLst>
+              <a:ext uri="{FF2B5EF4-FFF2-40B4-BE49-F238E27FC236}">
+                <a16:creationId xmlns:a16="http://schemas.microsoft.com/office/drawing/2014/main" id="{AD9C7AE4-E6F9-4662-9858-E0E539FB5F2F}"/>
+              </a:ext>
+            </a:extLst>
+          </p:cNvPr>
+          <p:cNvPicPr>
+            <a:picLocks noGrp="1" noChangeAspect="1"/>
+          </p:cNvPicPr>
+          <p:nvPr>
+            <p:ph idx="1"/>
+          </p:nvPr>
+        </p:nvPicPr>
+        <p:blipFill>
+          <a:blip r:embed="rId2"/>
+          <a:stretch>
+            <a:fillRect/>
+          </a:stretch>
+        </p:blipFill>
+        <p:spPr>
+          <a:xfrm>
+            <a:off x="558896" y="748079"/>
+            <a:ext cx="3746973" cy="3955138"/>
+          </a:xfrm>
+          <a:prstGeom prst="rect">
+            <a:avLst/>
+          </a:prstGeom>
+        </p:spPr>
+      </p:pic>
+      <p:pic>
+        <p:nvPicPr>
+          <p:cNvPr id="5" name="Picture 4">
+            <a:extLst>
+              <a:ext uri="{FF2B5EF4-FFF2-40B4-BE49-F238E27FC236}">
+                <a16:creationId xmlns:a16="http://schemas.microsoft.com/office/drawing/2014/main" id="{2394F229-1062-4772-B695-0F291A31688C}"/>
+              </a:ext>
+            </a:extLst>
+          </p:cNvPr>
+          <p:cNvPicPr>
+            <a:picLocks noChangeAspect="1"/>
+          </p:cNvPicPr>
+          <p:nvPr/>
+        </p:nvPicPr>
+        <p:blipFill>
+          <a:blip r:embed="rId3"/>
+          <a:stretch>
+            <a:fillRect/>
+          </a:stretch>
+        </p:blipFill>
+        <p:spPr>
+          <a:xfrm>
+            <a:off x="4406435" y="546663"/>
+            <a:ext cx="4602879" cy="4645555"/>
+          </a:xfrm>
+          <a:prstGeom prst="rect">
+            <a:avLst/>
+          </a:prstGeom>
+        </p:spPr>
+      </p:pic>
+    </p:spTree>
+    <p:extLst>
+      <p:ext uri="{BB962C8B-B14F-4D97-AF65-F5344CB8AC3E}">
+        <p14:creationId xmlns:p14="http://schemas.microsoft.com/office/powerpoint/2010/main" val="711917541"/>
+      </p:ext>
+    </p:extLst>
+  </p:cSld>
+  <p:clrMapOvr>
+    <a:masterClrMapping/>
+  </p:clrMapOvr>
+</p:sld>
+</file>
+
+<file path=ppt/slides/slide6.xml><?xml version="1.0" encoding="utf-8"?>
 <p:sld xmlns:a="http://schemas.openxmlformats.org/drawingml/2006/main" xmlns:r="http://schemas.openxmlformats.org/officeDocument/2006/relationships" xmlns:p="http://schemas.openxmlformats.org/presentationml/2006/main">
   <p:cSld>
     <p:spTree>
@@ -8582,7 +8809,7 @@
 </p:sld>
 </file>
 
-<file path=ppt/slides/slide5.xml><?xml version="1.0" encoding="utf-8"?>
+<file path=ppt/slides/slide7.xml><?xml version="1.0" encoding="utf-8"?>
 <p:sld xmlns:a="http://schemas.openxmlformats.org/drawingml/2006/main" xmlns:r="http://schemas.openxmlformats.org/officeDocument/2006/relationships" xmlns:p="http://schemas.openxmlformats.org/presentationml/2006/main">
   <p:cSld>
     <p:spTree>
@@ -10116,7 +10343,7 @@
 </p:sld>
 </file>
 
-<file path=ppt/slides/slide6.xml><?xml version="1.0" encoding="utf-8"?>
+<file path=ppt/slides/slide8.xml><?xml version="1.0" encoding="utf-8"?>
 <p:sld xmlns:a="http://schemas.openxmlformats.org/drawingml/2006/main" xmlns:r="http://schemas.openxmlformats.org/officeDocument/2006/relationships" xmlns:p="http://schemas.openxmlformats.org/presentationml/2006/main">
   <p:cSld>
     <p:spTree>
@@ -11239,7 +11466,7 @@
 </p:sld>
 </file>
 
-<file path=ppt/slides/slide7.xml><?xml version="1.0" encoding="utf-8"?>
+<file path=ppt/slides/slide9.xml><?xml version="1.0" encoding="utf-8"?>
 <p:sld xmlns:a="http://schemas.openxmlformats.org/drawingml/2006/main" xmlns:r="http://schemas.openxmlformats.org/officeDocument/2006/relationships" xmlns:p="http://schemas.openxmlformats.org/presentationml/2006/main">
   <p:cSld>
     <p:spTree>

</xml_diff>